<commit_message>
Added initialization script for task 4
</commit_message>
<xml_diff>
--- a/sql/lectures/7_data_modifications.pptx
+++ b/sql/lectures/7_data_modifications.pptx
@@ -118,7 +118,7 @@
   </p:defaultTextStyle>
   <p:extLst>
     <p:ext uri="{EFAFB233-063F-42B5-8137-9DF3F51BA10A}">
-      <p15:sldGuideLst xmlns:p15="http://schemas.microsoft.com/office/powerpoint/2012/main">
+      <p15:sldGuideLst xmlns="" xmlns:p15="http://schemas.microsoft.com/office/powerpoint/2012/main">
         <p15:guide id="1" orient="horz" pos="2160">
           <p15:clr>
             <a:srgbClr val="A4A3A4"/>
@@ -401,7 +401,7 @@
     </p:spTree>
     <p:extLst>
       <p:ext uri="{BB962C8B-B14F-4D97-AF65-F5344CB8AC3E}">
-        <p14:creationId xmlns:p14="http://schemas.microsoft.com/office/powerpoint/2010/main" val="201764440"/>
+        <p14:creationId xmlns="" xmlns:p14="http://schemas.microsoft.com/office/powerpoint/2010/main" val="201764440"/>
       </p:ext>
     </p:extLst>
   </p:cSld>
@@ -699,7 +699,7 @@
     </p:spTree>
     <p:extLst>
       <p:ext uri="{BB962C8B-B14F-4D97-AF65-F5344CB8AC3E}">
-        <p14:creationId xmlns:p14="http://schemas.microsoft.com/office/powerpoint/2010/main" val="3783072073"/>
+        <p14:creationId xmlns="" xmlns:p14="http://schemas.microsoft.com/office/powerpoint/2010/main" val="3783072073"/>
       </p:ext>
     </p:extLst>
   </p:cSld>
@@ -960,7 +960,7 @@
     </p:spTree>
     <p:extLst>
       <p:ext uri="{BB962C8B-B14F-4D97-AF65-F5344CB8AC3E}">
-        <p14:creationId xmlns:p14="http://schemas.microsoft.com/office/powerpoint/2010/main" val="1595295306"/>
+        <p14:creationId xmlns="" xmlns:p14="http://schemas.microsoft.com/office/powerpoint/2010/main" val="1595295306"/>
       </p:ext>
     </p:extLst>
   </p:cSld>
@@ -1522,7 +1522,7 @@
     </p:spTree>
     <p:extLst>
       <p:ext uri="{BB962C8B-B14F-4D97-AF65-F5344CB8AC3E}">
-        <p14:creationId xmlns:p14="http://schemas.microsoft.com/office/powerpoint/2010/main" val="3337821985"/>
+        <p14:creationId xmlns="" xmlns:p14="http://schemas.microsoft.com/office/powerpoint/2010/main" val="3337821985"/>
       </p:ext>
     </p:extLst>
   </p:cSld>
@@ -1783,7 +1783,7 @@
     </p:spTree>
     <p:extLst>
       <p:ext uri="{BB962C8B-B14F-4D97-AF65-F5344CB8AC3E}">
-        <p14:creationId xmlns:p14="http://schemas.microsoft.com/office/powerpoint/2010/main" val="886269531"/>
+        <p14:creationId xmlns="" xmlns:p14="http://schemas.microsoft.com/office/powerpoint/2010/main" val="886269531"/>
       </p:ext>
     </p:extLst>
   </p:cSld>
@@ -2361,7 +2361,7 @@
     </p:spTree>
     <p:extLst>
       <p:ext uri="{BB962C8B-B14F-4D97-AF65-F5344CB8AC3E}">
-        <p14:creationId xmlns:p14="http://schemas.microsoft.com/office/powerpoint/2010/main" val="2590523876"/>
+        <p14:creationId xmlns="" xmlns:p14="http://schemas.microsoft.com/office/powerpoint/2010/main" val="2590523876"/>
       </p:ext>
     </p:extLst>
   </p:cSld>
@@ -2695,7 +2695,7 @@
     </p:spTree>
     <p:extLst>
       <p:ext uri="{BB962C8B-B14F-4D97-AF65-F5344CB8AC3E}">
-        <p14:creationId xmlns:p14="http://schemas.microsoft.com/office/powerpoint/2010/main" val="2759155521"/>
+        <p14:creationId xmlns="" xmlns:p14="http://schemas.microsoft.com/office/powerpoint/2010/main" val="2759155521"/>
       </p:ext>
     </p:extLst>
   </p:cSld>
@@ -2872,7 +2872,7 @@
     </p:spTree>
     <p:extLst>
       <p:ext uri="{BB962C8B-B14F-4D97-AF65-F5344CB8AC3E}">
-        <p14:creationId xmlns:p14="http://schemas.microsoft.com/office/powerpoint/2010/main" val="1435342287"/>
+        <p14:creationId xmlns="" xmlns:p14="http://schemas.microsoft.com/office/powerpoint/2010/main" val="1435342287"/>
       </p:ext>
     </p:extLst>
   </p:cSld>
@@ -3054,7 +3054,7 @@
     </p:spTree>
     <p:extLst>
       <p:ext uri="{BB962C8B-B14F-4D97-AF65-F5344CB8AC3E}">
-        <p14:creationId xmlns:p14="http://schemas.microsoft.com/office/powerpoint/2010/main" val="681154642"/>
+        <p14:creationId xmlns="" xmlns:p14="http://schemas.microsoft.com/office/powerpoint/2010/main" val="681154642"/>
       </p:ext>
     </p:extLst>
   </p:cSld>
@@ -3226,7 +3226,7 @@
     </p:spTree>
     <p:extLst>
       <p:ext uri="{BB962C8B-B14F-4D97-AF65-F5344CB8AC3E}">
-        <p14:creationId xmlns:p14="http://schemas.microsoft.com/office/powerpoint/2010/main" val="4245128215"/>
+        <p14:creationId xmlns="" xmlns:p14="http://schemas.microsoft.com/office/powerpoint/2010/main" val="4245128215"/>
       </p:ext>
     </p:extLst>
   </p:cSld>
@@ -3487,7 +3487,7 @@
     </p:spTree>
     <p:extLst>
       <p:ext uri="{BB962C8B-B14F-4D97-AF65-F5344CB8AC3E}">
-        <p14:creationId xmlns:p14="http://schemas.microsoft.com/office/powerpoint/2010/main" val="2266164164"/>
+        <p14:creationId xmlns="" xmlns:p14="http://schemas.microsoft.com/office/powerpoint/2010/main" val="2266164164"/>
       </p:ext>
     </p:extLst>
   </p:cSld>
@@ -3781,7 +3781,7 @@
     </p:spTree>
     <p:extLst>
       <p:ext uri="{BB962C8B-B14F-4D97-AF65-F5344CB8AC3E}">
-        <p14:creationId xmlns:p14="http://schemas.microsoft.com/office/powerpoint/2010/main" val="148630802"/>
+        <p14:creationId xmlns="" xmlns:p14="http://schemas.microsoft.com/office/powerpoint/2010/main" val="148630802"/>
       </p:ext>
     </p:extLst>
   </p:cSld>
@@ -4213,7 +4213,7 @@
     </p:spTree>
     <p:extLst>
       <p:ext uri="{BB962C8B-B14F-4D97-AF65-F5344CB8AC3E}">
-        <p14:creationId xmlns:p14="http://schemas.microsoft.com/office/powerpoint/2010/main" val="563240317"/>
+        <p14:creationId xmlns="" xmlns:p14="http://schemas.microsoft.com/office/powerpoint/2010/main" val="563240317"/>
       </p:ext>
     </p:extLst>
   </p:cSld>
@@ -4339,7 +4339,7 @@
     </p:spTree>
     <p:extLst>
       <p:ext uri="{BB962C8B-B14F-4D97-AF65-F5344CB8AC3E}">
-        <p14:creationId xmlns:p14="http://schemas.microsoft.com/office/powerpoint/2010/main" val="3238447542"/>
+        <p14:creationId xmlns="" xmlns:p14="http://schemas.microsoft.com/office/powerpoint/2010/main" val="3238447542"/>
       </p:ext>
     </p:extLst>
   </p:cSld>
@@ -4436,7 +4436,7 @@
     </p:spTree>
     <p:extLst>
       <p:ext uri="{BB962C8B-B14F-4D97-AF65-F5344CB8AC3E}">
-        <p14:creationId xmlns:p14="http://schemas.microsoft.com/office/powerpoint/2010/main" val="2027820632"/>
+        <p14:creationId xmlns="" xmlns:p14="http://schemas.microsoft.com/office/powerpoint/2010/main" val="2027820632"/>
       </p:ext>
     </p:extLst>
   </p:cSld>
@@ -4721,7 +4721,7 @@
     </p:spTree>
     <p:extLst>
       <p:ext uri="{BB962C8B-B14F-4D97-AF65-F5344CB8AC3E}">
-        <p14:creationId xmlns:p14="http://schemas.microsoft.com/office/powerpoint/2010/main" val="712994137"/>
+        <p14:creationId xmlns="" xmlns:p14="http://schemas.microsoft.com/office/powerpoint/2010/main" val="712994137"/>
       </p:ext>
     </p:extLst>
   </p:cSld>
@@ -5024,7 +5024,7 @@
     </p:spTree>
     <p:extLst>
       <p:ext uri="{BB962C8B-B14F-4D97-AF65-F5344CB8AC3E}">
-        <p14:creationId xmlns:p14="http://schemas.microsoft.com/office/powerpoint/2010/main" val="2328979833"/>
+        <p14:creationId xmlns="" xmlns:p14="http://schemas.microsoft.com/office/powerpoint/2010/main" val="2328979833"/>
       </p:ext>
     </p:extLst>
   </p:cSld>
@@ -5299,7 +5299,7 @@
     </p:spTree>
     <p:extLst>
       <p:ext uri="{BB962C8B-B14F-4D97-AF65-F5344CB8AC3E}">
-        <p14:creationId xmlns:p14="http://schemas.microsoft.com/office/powerpoint/2010/main" val="1737108718"/>
+        <p14:creationId xmlns="" xmlns:p14="http://schemas.microsoft.com/office/powerpoint/2010/main" val="1737108718"/>
       </p:ext>
     </p:extLst>
   </p:cSld>
@@ -6040,7 +6040,7 @@
     </p:spTree>
     <p:extLst>
       <p:ext uri="{BB962C8B-B14F-4D97-AF65-F5344CB8AC3E}">
-        <p14:creationId xmlns:p14="http://schemas.microsoft.com/office/powerpoint/2010/main" val="3831373085"/>
+        <p14:creationId xmlns="" xmlns:p14="http://schemas.microsoft.com/office/powerpoint/2010/main" val="3831373085"/>
       </p:ext>
     </p:extLst>
   </p:cSld>
@@ -6115,7 +6115,7 @@
         </p:spPr>
         <p:txBody>
           <a:bodyPr>
-            <a:normAutofit/>
+            <a:normAutofit lnSpcReduction="10000"/>
           </a:bodyPr>
           <a:lstStyle/>
           <a:p>
@@ -6124,7 +6124,7 @@
             </a:pPr>
             <a:r>
               <a:rPr lang="ru-RU" sz="2400" dirty="0" smtClean="0"/>
-              <a:t>	Удалить всех студентов, которые подавали 	документы более чем на 2 разных факультета.</a:t>
+              <a:t>	Удалить заявки всех студентов, которые 	подавали документы более чем на 2 разных 	факультета.</a:t>
             </a:r>
           </a:p>
           <a:p>
@@ -6323,13 +6323,20 @@
     </p:spTree>
     <p:extLst>
       <p:ext uri="{BB962C8B-B14F-4D97-AF65-F5344CB8AC3E}">
-        <p14:creationId xmlns:p14="http://schemas.microsoft.com/office/powerpoint/2010/main" val="4218822883"/>
+        <p14:creationId xmlns="" xmlns:p14="http://schemas.microsoft.com/office/powerpoint/2010/main" val="4218822883"/>
       </p:ext>
     </p:extLst>
   </p:cSld>
   <p:clrMapOvr>
     <a:masterClrMapping/>
   </p:clrMapOvr>
+  <p:timing>
+    <p:tnLst>
+      <p:par>
+        <p:cTn id="1" dur="indefinite" restart="never" nodeType="tmRoot"/>
+      </p:par>
+    </p:tnLst>
+  </p:timing>
 </p:sld>
 </file>
 
@@ -6428,11 +6435,11 @@
             </a:r>
             <a:r>
               <a:rPr lang="en-US" sz="2400" dirty="0" smtClean="0"/>
-              <a:t>GPA &lt; 3.6</a:t>
+              <a:t>GPA &lt; </a:t>
             </a:r>
             <a:r>
               <a:rPr lang="ru-RU" sz="2400" dirty="0" smtClean="0"/>
-              <a:t>, но зачислить их</a:t>
+              <a:t>4.0, но зачислить их</a:t>
             </a:r>
             <a:r>
               <a:rPr lang="en-US" sz="2400" dirty="0" smtClean="0"/>
@@ -6452,12 +6459,21 @@
             </a:r>
             <a:r>
               <a:rPr lang="en-US" sz="2400" dirty="0" smtClean="0"/>
-              <a:t> ‘Economics’</a:t>
+              <a:t> ‘Economics</a:t>
+            </a:r>
+            <a:r>
+              <a:rPr lang="en-US" sz="2400" dirty="0" smtClean="0"/>
+              <a:t>’</a:t>
             </a:r>
             <a:r>
               <a:rPr lang="ru-RU" sz="2400" dirty="0" smtClean="0"/>
-              <a:t>.</a:t>
-            </a:r>
+              <a:t> университета </a:t>
+            </a:r>
+            <a:r>
+              <a:rPr lang="en-US" sz="2400" dirty="0" smtClean="0"/>
+              <a:t>‘TPU’.</a:t>
+            </a:r>
+            <a:endParaRPr lang="ru-RU" sz="2400" dirty="0" smtClean="0"/>
           </a:p>
           <a:p>
             <a:pPr marL="0" indent="0">
@@ -6649,8 +6665,17 @@
             </a:r>
             <a:r>
               <a:rPr lang="en-US" sz="2400" dirty="0" smtClean="0"/>
-              <a:t> GPA &lt; 3.6)</a:t>
-            </a:r>
+              <a:t> GPA &lt; </a:t>
+            </a:r>
+            <a:r>
+              <a:rPr lang="ru-RU" sz="2400" dirty="0" smtClean="0"/>
+              <a:t>4.</a:t>
+            </a:r>
+            <a:r>
+              <a:rPr lang="en-US" sz="2400" dirty="0" smtClean="0"/>
+              <a:t>5)</a:t>
+            </a:r>
+            <a:endParaRPr lang="en-US" sz="2400" dirty="0" smtClean="0"/>
           </a:p>
           <a:p>
             <a:pPr marL="0" indent="0">
@@ -6667,13 +6692,20 @@
     </p:spTree>
     <p:extLst>
       <p:ext uri="{BB962C8B-B14F-4D97-AF65-F5344CB8AC3E}">
-        <p14:creationId xmlns:p14="http://schemas.microsoft.com/office/powerpoint/2010/main" val="3094669087"/>
+        <p14:creationId xmlns="" xmlns:p14="http://schemas.microsoft.com/office/powerpoint/2010/main" val="3094669087"/>
       </p:ext>
     </p:extLst>
   </p:cSld>
   <p:clrMapOvr>
     <a:masterClrMapping/>
   </p:clrMapOvr>
+  <p:timing>
+    <p:tnLst>
+      <p:par>
+        <p:cTn id="1" dur="indefinite" restart="never" nodeType="tmRoot"/>
+      </p:par>
+    </p:tnLst>
+  </p:timing>
 </p:sld>
 </file>
 
@@ -6772,7 +6804,7 @@
             </a:r>
             <a:r>
               <a:rPr lang="en-US" sz="2400" dirty="0" smtClean="0"/>
-              <a:t>CSE</a:t>
+              <a:t>CS</a:t>
             </a:r>
             <a:r>
               <a:rPr lang="ru-RU" sz="2400" dirty="0" smtClean="0"/>
@@ -7089,13 +7121,20 @@
     </p:spTree>
     <p:extLst>
       <p:ext uri="{BB962C8B-B14F-4D97-AF65-F5344CB8AC3E}">
-        <p14:creationId xmlns:p14="http://schemas.microsoft.com/office/powerpoint/2010/main" val="2542181881"/>
+        <p14:creationId xmlns="" xmlns:p14="http://schemas.microsoft.com/office/powerpoint/2010/main" val="2542181881"/>
       </p:ext>
     </p:extLst>
   </p:cSld>
   <p:clrMapOvr>
     <a:masterClrMapping/>
   </p:clrMapOvr>
+  <p:timing>
+    <p:tnLst>
+      <p:par>
+        <p:cTn id="1" dur="indefinite" restart="never" nodeType="tmRoot"/>
+      </p:par>
+    </p:tnLst>
+  </p:timing>
 </p:sld>
 </file>
 
@@ -7225,7 +7264,11 @@
               <a:t>	</a:t>
             </a:r>
             <a:r>
-              <a:rPr lang="en-US" sz="2400" dirty="0" smtClean="0"/>
+              <a:rPr lang="en-US" sz="2400" dirty="0" smtClean="0">
+                <a:solidFill>
+                  <a:srgbClr val="00B0F0"/>
+                </a:solidFill>
+              </a:rPr>
               <a:t>SET</a:t>
             </a:r>
           </a:p>
@@ -7277,6 +7320,11 @@
               <a:rPr lang="en-US" sz="2400" dirty="0" smtClean="0"/>
               <a:t> STUDENT</a:t>
             </a:r>
+            <a:r>
+              <a:rPr lang="ru-RU" sz="2400" dirty="0" smtClean="0"/>
+              <a:t>),</a:t>
+            </a:r>
+            <a:endParaRPr lang="en-US" sz="2400" dirty="0" smtClean="0"/>
           </a:p>
           <a:p>
             <a:pPr marL="0" indent="0">
@@ -7348,13 +7396,20 @@
     </p:spTree>
     <p:extLst>
       <p:ext uri="{BB962C8B-B14F-4D97-AF65-F5344CB8AC3E}">
-        <p14:creationId xmlns:p14="http://schemas.microsoft.com/office/powerpoint/2010/main" val="4014484938"/>
+        <p14:creationId xmlns="" xmlns:p14="http://schemas.microsoft.com/office/powerpoint/2010/main" val="4014484938"/>
       </p:ext>
     </p:extLst>
   </p:cSld>
   <p:clrMapOvr>
     <a:masterClrMapping/>
   </p:clrMapOvr>
+  <p:timing>
+    <p:tnLst>
+      <p:par>
+        <p:cTn id="1" dur="indefinite" restart="never" nodeType="tmRoot"/>
+      </p:par>
+    </p:tnLst>
+  </p:timing>
 </p:sld>
 </file>
 
@@ -7528,15 +7583,7 @@
                   <a:srgbClr val="FF0000"/>
                 </a:solidFill>
               </a:rPr>
-              <a:t>TABLE </a:t>
-            </a:r>
-            <a:r>
-              <a:rPr lang="en-US" sz="2400" dirty="0" smtClean="0">
-                <a:solidFill>
-                  <a:srgbClr val="FF0000"/>
-                </a:solidFill>
-              </a:rPr>
-              <a:t>SELECT-</a:t>
+              <a:t>TABLE SELECT-</a:t>
             </a:r>
             <a:r>
               <a:rPr lang="ru-RU" sz="2400" dirty="0" smtClean="0">
@@ -7557,7 +7604,7 @@
     </p:spTree>
     <p:extLst>
       <p:ext uri="{BB962C8B-B14F-4D97-AF65-F5344CB8AC3E}">
-        <p14:creationId xmlns:p14="http://schemas.microsoft.com/office/powerpoint/2010/main" val="2576379856"/>
+        <p14:creationId xmlns="" xmlns:p14="http://schemas.microsoft.com/office/powerpoint/2010/main" val="2576379856"/>
       </p:ext>
     </p:extLst>
   </p:cSld>
@@ -7705,13 +7752,20 @@
     </p:spTree>
     <p:extLst>
       <p:ext uri="{BB962C8B-B14F-4D97-AF65-F5344CB8AC3E}">
-        <p14:creationId xmlns:p14="http://schemas.microsoft.com/office/powerpoint/2010/main" val="911146962"/>
+        <p14:creationId xmlns="" xmlns:p14="http://schemas.microsoft.com/office/powerpoint/2010/main" val="911146962"/>
       </p:ext>
     </p:extLst>
   </p:cSld>
   <p:clrMapOvr>
     <a:masterClrMapping/>
   </p:clrMapOvr>
+  <p:timing>
+    <p:tnLst>
+      <p:par>
+        <p:cTn id="1" dur="indefinite" restart="never" nodeType="tmRoot"/>
+      </p:par>
+    </p:tnLst>
+  </p:timing>
 </p:sld>
 </file>
 
@@ -7880,13 +7934,20 @@
     </p:spTree>
     <p:extLst>
       <p:ext uri="{BB962C8B-B14F-4D97-AF65-F5344CB8AC3E}">
-        <p14:creationId xmlns:p14="http://schemas.microsoft.com/office/powerpoint/2010/main" val="4278550825"/>
+        <p14:creationId xmlns="" xmlns:p14="http://schemas.microsoft.com/office/powerpoint/2010/main" val="4278550825"/>
       </p:ext>
     </p:extLst>
   </p:cSld>
   <p:clrMapOvr>
     <a:masterClrMapping/>
   </p:clrMapOvr>
+  <p:timing>
+    <p:tnLst>
+      <p:par>
+        <p:cTn id="1" dur="indefinite" restart="never" nodeType="tmRoot"/>
+      </p:par>
+    </p:tnLst>
+  </p:timing>
 </p:sld>
 </file>
 
@@ -8103,13 +8164,20 @@
     </p:spTree>
     <p:extLst>
       <p:ext uri="{BB962C8B-B14F-4D97-AF65-F5344CB8AC3E}">
-        <p14:creationId xmlns:p14="http://schemas.microsoft.com/office/powerpoint/2010/main" val="2251589202"/>
+        <p14:creationId xmlns="" xmlns:p14="http://schemas.microsoft.com/office/powerpoint/2010/main" val="2251589202"/>
       </p:ext>
     </p:extLst>
   </p:cSld>
   <p:clrMapOvr>
     <a:masterClrMapping/>
   </p:clrMapOvr>
+  <p:timing>
+    <p:tnLst>
+      <p:par>
+        <p:cTn id="1" dur="indefinite" restart="never" nodeType="tmRoot"/>
+      </p:par>
+    </p:tnLst>
+  </p:timing>
 </p:sld>
 </file>
 
@@ -8241,13 +8309,20 @@
     </p:spTree>
     <p:extLst>
       <p:ext uri="{BB962C8B-B14F-4D97-AF65-F5344CB8AC3E}">
-        <p14:creationId xmlns:p14="http://schemas.microsoft.com/office/powerpoint/2010/main" val="1566039086"/>
+        <p14:creationId xmlns="" xmlns:p14="http://schemas.microsoft.com/office/powerpoint/2010/main" val="1566039086"/>
       </p:ext>
     </p:extLst>
   </p:cSld>
   <p:clrMapOvr>
     <a:masterClrMapping/>
   </p:clrMapOvr>
+  <p:timing>
+    <p:tnLst>
+      <p:par>
+        <p:cTn id="1" dur="indefinite" restart="never" nodeType="tmRoot"/>
+      </p:par>
+    </p:tnLst>
+  </p:timing>
 </p:sld>
 </file>
 
@@ -8487,13 +8562,20 @@
     </p:spTree>
     <p:extLst>
       <p:ext uri="{BB962C8B-B14F-4D97-AF65-F5344CB8AC3E}">
-        <p14:creationId xmlns:p14="http://schemas.microsoft.com/office/powerpoint/2010/main" val="3228046447"/>
+        <p14:creationId xmlns="" xmlns:p14="http://schemas.microsoft.com/office/powerpoint/2010/main" val="3228046447"/>
       </p:ext>
     </p:extLst>
   </p:cSld>
   <p:clrMapOvr>
     <a:masterClrMapping/>
   </p:clrMapOvr>
+  <p:timing>
+    <p:tnLst>
+      <p:par>
+        <p:cTn id="1" dur="indefinite" restart="never" nodeType="tmRoot"/>
+      </p:par>
+    </p:tnLst>
+  </p:timing>
 </p:sld>
 </file>
 
@@ -8715,7 +8797,7 @@
             </a:r>
             <a:r>
               <a:rPr lang="en-US" sz="2400" dirty="0" smtClean="0"/>
-              <a:t> NOT IN (</a:t>
+              <a:t> IN (</a:t>
             </a:r>
           </a:p>
           <a:p>
@@ -8776,13 +8858,20 @@
     </p:spTree>
     <p:extLst>
       <p:ext uri="{BB962C8B-B14F-4D97-AF65-F5344CB8AC3E}">
-        <p14:creationId xmlns:p14="http://schemas.microsoft.com/office/powerpoint/2010/main" val="3264943563"/>
+        <p14:creationId xmlns="" xmlns:p14="http://schemas.microsoft.com/office/powerpoint/2010/main" val="3264943563"/>
       </p:ext>
     </p:extLst>
   </p:cSld>
   <p:clrMapOvr>
     <a:masterClrMapping/>
   </p:clrMapOvr>
+  <p:timing>
+    <p:tnLst>
+      <p:par>
+        <p:cTn id="1" dur="indefinite" restart="never" nodeType="tmRoot"/>
+      </p:par>
+    </p:tnLst>
+  </p:timing>
 </p:sld>
 </file>
 
@@ -8853,7 +8942,35 @@
             </a:pPr>
             <a:r>
               <a:rPr lang="ru-RU" sz="2400" dirty="0" smtClean="0"/>
-              <a:t>	Удалить всех студентов, которые подавали 	документы более чем на 2 разных факультета.</a:t>
+              <a:t>	Удалить </a:t>
+            </a:r>
+            <a:r>
+              <a:rPr lang="ru-RU" sz="2400" dirty="0" smtClean="0"/>
+              <a:t>заявки </a:t>
+            </a:r>
+            <a:r>
+              <a:rPr lang="ru-RU" sz="2400" dirty="0" smtClean="0"/>
+              <a:t>всех </a:t>
+            </a:r>
+            <a:r>
+              <a:rPr lang="ru-RU" sz="2400" dirty="0" smtClean="0"/>
+              <a:t>студентов, которые </a:t>
+            </a:r>
+            <a:r>
+              <a:rPr lang="ru-RU" sz="2400" dirty="0" smtClean="0"/>
+              <a:t>	подавали документы </a:t>
+            </a:r>
+            <a:r>
+              <a:rPr lang="ru-RU" sz="2400" dirty="0" smtClean="0"/>
+              <a:t>более чем на 2 разных </a:t>
+            </a:r>
+            <a:r>
+              <a:rPr lang="ru-RU" sz="2400" dirty="0" smtClean="0"/>
+              <a:t>	факультета</a:t>
+            </a:r>
+            <a:r>
+              <a:rPr lang="ru-RU" sz="2400" dirty="0" smtClean="0"/>
+              <a:t>.</a:t>
             </a:r>
           </a:p>
           <a:p>
@@ -9045,13 +9162,20 @@
     </p:spTree>
     <p:extLst>
       <p:ext uri="{BB962C8B-B14F-4D97-AF65-F5344CB8AC3E}">
-        <p14:creationId xmlns:p14="http://schemas.microsoft.com/office/powerpoint/2010/main" val="3889666619"/>
+        <p14:creationId xmlns="" xmlns:p14="http://schemas.microsoft.com/office/powerpoint/2010/main" val="3889666619"/>
       </p:ext>
     </p:extLst>
   </p:cSld>
   <p:clrMapOvr>
     <a:masterClrMapping/>
   </p:clrMapOvr>
+  <p:timing>
+    <p:tnLst>
+      <p:par>
+        <p:cTn id="1" dur="indefinite" restart="never" nodeType="tmRoot"/>
+      </p:par>
+    </p:tnLst>
+  </p:timing>
 </p:sld>
 </file>
 
@@ -9305,7 +9429,7 @@
   <a:extraClrSchemeLst/>
   <a:extLst>
     <a:ext uri="{05A4C25C-085E-4340-85A3-A5531E510DB2}">
-      <thm15:themeFamily xmlns:thm15="http://schemas.microsoft.com/office/thememl/2012/main" name="Mesh" id="{789EC3FE-34FD-429C-9918-760025E6C145}" vid="{B8BE45C0-8141-4D58-8C71-A009BC26FBBB}"/>
+      <thm15:themeFamily xmlns="" xmlns:thm15="http://schemas.microsoft.com/office/thememl/2012/main" name="Mesh" id="{789EC3FE-34FD-429C-9918-760025E6C145}" vid="{B8BE45C0-8141-4D58-8C71-A009BC26FBBB}"/>
     </a:ext>
   </a:extLst>
 </a:theme>

</xml_diff>